<commit_message>
Modified the final presentation
</commit_message>
<xml_diff>
--- a/Documents/Fall2021/BioRube_FinalPresentation.pptx
+++ b/Documents/Fall2021/BioRube_FinalPresentation.pptx
@@ -218,7 +218,7 @@
           <a:p>
             <a:fld id="{9B8F34BF-712A-0643-8EC8-7DCBAE62A3CD}" type="datetimeFigureOut">
               <a:rPr lang="en-US" smtClean="0"/>
-              <a:t>11/20/21</a:t>
+              <a:t>12/3/21</a:t>
             </a:fld>
             <a:endParaRPr lang="en-US"/>
           </a:p>
@@ -820,7 +820,7 @@
           <a:p>
             <a:fld id="{1929AEBC-83EF-AC4C-AC8C-FC8C7A735B7A}" type="datetime1">
               <a:rPr lang="en-US" smtClean="0"/>
-              <a:t>11/20/21</a:t>
+              <a:t>12/3/21</a:t>
             </a:fld>
             <a:endParaRPr lang="en-US" dirty="0"/>
           </a:p>
@@ -1904,7 +1904,7 @@
           <a:p>
             <a:fld id="{7D07C23B-9040-B546-A962-091F9F315267}" type="datetime1">
               <a:rPr lang="en-US" smtClean="0"/>
-              <a:t>11/20/21</a:t>
+              <a:t>12/3/21</a:t>
             </a:fld>
             <a:endParaRPr lang="en-US" dirty="0"/>
           </a:p>
@@ -2880,7 +2880,7 @@
           <a:p>
             <a:fld id="{6AEAC65A-E97A-C243-A006-FD15FD43BBDF}" type="datetime1">
               <a:rPr lang="en-US" smtClean="0"/>
-              <a:t>11/20/21</a:t>
+              <a:t>12/3/21</a:t>
             </a:fld>
             <a:endParaRPr lang="en-US" dirty="0"/>
           </a:p>
@@ -4010,7 +4010,7 @@
           <a:p>
             <a:fld id="{164CB78B-A6E7-E44A-A6F4-183617DC5E0C}" type="datetime1">
               <a:rPr lang="en-US" smtClean="0"/>
-              <a:t>11/20/21</a:t>
+              <a:t>12/3/21</a:t>
             </a:fld>
             <a:endParaRPr lang="en-US" dirty="0"/>
           </a:p>
@@ -5039,7 +5039,7 @@
           <a:p>
             <a:fld id="{F7A20208-406B-FA48-AF5C-5B86E245A57C}" type="datetime1">
               <a:rPr lang="en-US" smtClean="0"/>
-              <a:t>11/20/21</a:t>
+              <a:t>12/3/21</a:t>
             </a:fld>
             <a:endParaRPr lang="en-US" dirty="0"/>
           </a:p>
@@ -5695,7 +5695,7 @@
           <a:p>
             <a:fld id="{BC4D8892-3767-EB4D-A127-7ED5FDF1FB79}" type="datetime1">
               <a:rPr lang="en-US" smtClean="0"/>
-              <a:t>11/20/21</a:t>
+              <a:t>12/3/21</a:t>
             </a:fld>
             <a:endParaRPr lang="en-US" dirty="0"/>
           </a:p>
@@ -6552,7 +6552,7 @@
           <a:p>
             <a:fld id="{5F46084C-4CE2-2D48-BD81-90A070AEB2BA}" type="datetime1">
               <a:rPr lang="en-US" smtClean="0"/>
-              <a:t>11/20/21</a:t>
+              <a:t>12/3/21</a:t>
             </a:fld>
             <a:endParaRPr lang="en-US" dirty="0"/>
           </a:p>
@@ -6738,7 +6738,7 @@
           <a:p>
             <a:fld id="{A0B97A2F-FFEC-544A-9C48-D46DE077646B}" type="datetime1">
               <a:rPr lang="en-US" smtClean="0"/>
-              <a:t>11/20/21</a:t>
+              <a:t>12/3/21</a:t>
             </a:fld>
             <a:endParaRPr lang="en-US" dirty="0"/>
           </a:p>
@@ -7706,7 +7706,7 @@
           <a:p>
             <a:fld id="{CAE5090E-91DF-C742-B7AD-E89EFB0DE9DF}" type="datetime1">
               <a:rPr lang="en-US" smtClean="0"/>
-              <a:t>11/20/21</a:t>
+              <a:t>12/3/21</a:t>
             </a:fld>
             <a:endParaRPr lang="en-US" dirty="0"/>
           </a:p>
@@ -7913,7 +7913,7 @@
           <a:p>
             <a:fld id="{6B402171-AB77-A642-951E-30FBA07ED164}" type="datetime1">
               <a:rPr lang="en-US" smtClean="0"/>
-              <a:t>11/20/21</a:t>
+              <a:t>12/3/21</a:t>
             </a:fld>
             <a:endParaRPr lang="en-US" dirty="0"/>
           </a:p>
@@ -8943,7 +8943,7 @@
           <a:p>
             <a:fld id="{B6E9A087-EB21-D847-B46C-64CE2A298F08}" type="datetime1">
               <a:rPr lang="en-US" smtClean="0"/>
-              <a:t>11/20/21</a:t>
+              <a:t>12/3/21</a:t>
             </a:fld>
             <a:endParaRPr lang="en-US" dirty="0"/>
           </a:p>
@@ -9211,7 +9211,7 @@
           <a:p>
             <a:fld id="{D09BF379-FF43-804F-A90A-F3D8420998FE}" type="datetime1">
               <a:rPr lang="en-US" smtClean="0"/>
-              <a:t>11/20/21</a:t>
+              <a:t>12/3/21</a:t>
             </a:fld>
             <a:endParaRPr lang="en-US" dirty="0"/>
           </a:p>
@@ -9617,7 +9617,7 @@
           <a:p>
             <a:fld id="{0B058D71-6222-DF47-A911-F8635ACBA986}" type="datetime1">
               <a:rPr lang="en-US" smtClean="0"/>
-              <a:t>11/20/21</a:t>
+              <a:t>12/3/21</a:t>
             </a:fld>
             <a:endParaRPr lang="en-US" dirty="0"/>
           </a:p>
@@ -9740,7 +9740,7 @@
           <a:p>
             <a:fld id="{C0BE3A91-32C2-3540-8186-BB2BD592F961}" type="datetime1">
               <a:rPr lang="en-US" smtClean="0"/>
-              <a:t>11/20/21</a:t>
+              <a:t>12/3/21</a:t>
             </a:fld>
             <a:endParaRPr lang="en-US" dirty="0"/>
           </a:p>
@@ -9831,7 +9831,7 @@
           <a:p>
             <a:fld id="{AE7FB892-FA78-1B4F-87FA-174CF7E857E0}" type="datetime1">
               <a:rPr lang="en-US" smtClean="0"/>
-              <a:t>11/20/21</a:t>
+              <a:t>12/3/21</a:t>
             </a:fld>
             <a:endParaRPr lang="en-US" dirty="0"/>
           </a:p>
@@ -10908,7 +10908,7 @@
           <a:p>
             <a:fld id="{81C0DDAD-B7FB-DD46-A6FB-04ADAA906E8A}" type="datetime1">
               <a:rPr lang="en-US" smtClean="0"/>
-              <a:t>11/20/21</a:t>
+              <a:t>12/3/21</a:t>
             </a:fld>
             <a:endParaRPr lang="en-US" dirty="0"/>
           </a:p>
@@ -12012,7 +12012,7 @@
           <a:p>
             <a:fld id="{DA2E3B8B-7B02-6242-AD5C-EE37FEFF210E}" type="datetime1">
               <a:rPr lang="en-US" smtClean="0"/>
-              <a:t>11/20/21</a:t>
+              <a:t>12/3/21</a:t>
             </a:fld>
             <a:endParaRPr lang="en-US" dirty="0"/>
           </a:p>
@@ -13005,7 +13005,7 @@
           <a:p>
             <a:fld id="{42F032B0-9697-9C46-A1ED-53EE914D384D}" type="datetime1">
               <a:rPr lang="en-US" smtClean="0"/>
-              <a:t>11/20/21</a:t>
+              <a:t>12/3/21</a:t>
             </a:fld>
             <a:endParaRPr lang="en-US" dirty="0"/>
           </a:p>
@@ -13616,7 +13616,7 @@
           <a:p>
             <a:r>
               <a:rPr lang="en-US" dirty="0"/>
-              <a:t>Status of activities</a:t>
+              <a:t>Final Presentation</a:t>
             </a:r>
           </a:p>
         </p:txBody>
@@ -13886,12 +13886,6 @@
               <a:t>This helps players to retain the knowledge they gain while playing the game</a:t>
             </a:r>
           </a:p>
-          <a:p>
-            <a:r>
-              <a:rPr lang="en-US" dirty="0"/>
-              <a:t>The game has not been working with recent versions of iOS</a:t>
-            </a:r>
-          </a:p>
         </p:txBody>
       </p:sp>
       <p:sp>
@@ -14134,7 +14128,7 @@
         </p:spPr>
         <p:txBody>
           <a:bodyPr>
-            <a:normAutofit lnSpcReduction="10000"/>
+            <a:normAutofit fontScale="92500" lnSpcReduction="10000"/>
           </a:bodyPr>
           <a:lstStyle/>
           <a:p>
@@ -14161,7 +14155,14 @@
             <a:pPr lvl="1"/>
             <a:r>
               <a:rPr lang="en-US" dirty="0"/>
-              <a:t>Unfamiliar with previous work and a steep Unity, git, and C# learning curve</a:t>
+              <a:t>Unfamiliar with previous work </a:t>
+            </a:r>
+          </a:p>
+          <a:p>
+            <a:pPr lvl="1"/>
+            <a:r>
+              <a:rPr lang="en-US" dirty="0"/>
+              <a:t>Steep learning curve for Unity, git, and C#</a:t>
             </a:r>
           </a:p>
           <a:p>
@@ -14914,7 +14915,7 @@
         </p:nvSpPr>
         <p:spPr>
           <a:xfrm>
-            <a:off x="1154954" y="2603499"/>
+            <a:off x="1154954" y="2486767"/>
             <a:ext cx="8825659" cy="3628335"/>
           </a:xfrm>
         </p:spPr>

</xml_diff>